<commit_message>
Bend can support arbitrary turning angle now. Add Emitter. Add AlignEBL.
</commit_message>
<xml_diff>
--- a/Bend/image/image.pptx
+++ b/Bend/image/image.pptx
@@ -259,7 +259,7 @@
           <a:p>
             <a:fld id="{44EA048A-2452-4573-944D-152AB9E322CF}" type="datetimeFigureOut">
               <a:rPr lang="zh-TW" altLang="en-US" smtClean="0"/>
-              <a:t>2025/4/1</a:t>
+              <a:t>2025/4/13</a:t>
             </a:fld>
             <a:endParaRPr lang="zh-TW" altLang="en-US"/>
           </a:p>
@@ -457,7 +457,7 @@
           <a:p>
             <a:fld id="{44EA048A-2452-4573-944D-152AB9E322CF}" type="datetimeFigureOut">
               <a:rPr lang="zh-TW" altLang="en-US" smtClean="0"/>
-              <a:t>2025/4/1</a:t>
+              <a:t>2025/4/13</a:t>
             </a:fld>
             <a:endParaRPr lang="zh-TW" altLang="en-US"/>
           </a:p>
@@ -665,7 +665,7 @@
           <a:p>
             <a:fld id="{44EA048A-2452-4573-944D-152AB9E322CF}" type="datetimeFigureOut">
               <a:rPr lang="zh-TW" altLang="en-US" smtClean="0"/>
-              <a:t>2025/4/1</a:t>
+              <a:t>2025/4/13</a:t>
             </a:fld>
             <a:endParaRPr lang="zh-TW" altLang="en-US"/>
           </a:p>
@@ -863,7 +863,7 @@
           <a:p>
             <a:fld id="{44EA048A-2452-4573-944D-152AB9E322CF}" type="datetimeFigureOut">
               <a:rPr lang="zh-TW" altLang="en-US" smtClean="0"/>
-              <a:t>2025/4/1</a:t>
+              <a:t>2025/4/13</a:t>
             </a:fld>
             <a:endParaRPr lang="zh-TW" altLang="en-US"/>
           </a:p>
@@ -1138,7 +1138,7 @@
           <a:p>
             <a:fld id="{44EA048A-2452-4573-944D-152AB9E322CF}" type="datetimeFigureOut">
               <a:rPr lang="zh-TW" altLang="en-US" smtClean="0"/>
-              <a:t>2025/4/1</a:t>
+              <a:t>2025/4/13</a:t>
             </a:fld>
             <a:endParaRPr lang="zh-TW" altLang="en-US"/>
           </a:p>
@@ -1403,7 +1403,7 @@
           <a:p>
             <a:fld id="{44EA048A-2452-4573-944D-152AB9E322CF}" type="datetimeFigureOut">
               <a:rPr lang="zh-TW" altLang="en-US" smtClean="0"/>
-              <a:t>2025/4/1</a:t>
+              <a:t>2025/4/13</a:t>
             </a:fld>
             <a:endParaRPr lang="zh-TW" altLang="en-US"/>
           </a:p>
@@ -1815,7 +1815,7 @@
           <a:p>
             <a:fld id="{44EA048A-2452-4573-944D-152AB9E322CF}" type="datetimeFigureOut">
               <a:rPr lang="zh-TW" altLang="en-US" smtClean="0"/>
-              <a:t>2025/4/1</a:t>
+              <a:t>2025/4/13</a:t>
             </a:fld>
             <a:endParaRPr lang="zh-TW" altLang="en-US"/>
           </a:p>
@@ -1956,7 +1956,7 @@
           <a:p>
             <a:fld id="{44EA048A-2452-4573-944D-152AB9E322CF}" type="datetimeFigureOut">
               <a:rPr lang="zh-TW" altLang="en-US" smtClean="0"/>
-              <a:t>2025/4/1</a:t>
+              <a:t>2025/4/13</a:t>
             </a:fld>
             <a:endParaRPr lang="zh-TW" altLang="en-US"/>
           </a:p>
@@ -2069,7 +2069,7 @@
           <a:p>
             <a:fld id="{44EA048A-2452-4573-944D-152AB9E322CF}" type="datetimeFigureOut">
               <a:rPr lang="zh-TW" altLang="en-US" smtClean="0"/>
-              <a:t>2025/4/1</a:t>
+              <a:t>2025/4/13</a:t>
             </a:fld>
             <a:endParaRPr lang="zh-TW" altLang="en-US"/>
           </a:p>
@@ -2380,7 +2380,7 @@
           <a:p>
             <a:fld id="{44EA048A-2452-4573-944D-152AB9E322CF}" type="datetimeFigureOut">
               <a:rPr lang="zh-TW" altLang="en-US" smtClean="0"/>
-              <a:t>2025/4/1</a:t>
+              <a:t>2025/4/13</a:t>
             </a:fld>
             <a:endParaRPr lang="zh-TW" altLang="en-US"/>
           </a:p>
@@ -2668,7 +2668,7 @@
           <a:p>
             <a:fld id="{44EA048A-2452-4573-944D-152AB9E322CF}" type="datetimeFigureOut">
               <a:rPr lang="zh-TW" altLang="en-US" smtClean="0"/>
-              <a:t>2025/4/1</a:t>
+              <a:t>2025/4/13</a:t>
             </a:fld>
             <a:endParaRPr lang="zh-TW" altLang="en-US"/>
           </a:p>
@@ -2909,7 +2909,7 @@
           <a:p>
             <a:fld id="{44EA048A-2452-4573-944D-152AB9E322CF}" type="datetimeFigureOut">
               <a:rPr lang="zh-TW" altLang="en-US" smtClean="0"/>
-              <a:t>2025/4/1</a:t>
+              <a:t>2025/4/13</a:t>
             </a:fld>
             <a:endParaRPr lang="zh-TW" altLang="en-US"/>
           </a:p>
@@ -3341,15 +3341,20 @@
           <p:nvPr/>
         </p:nvPicPr>
         <p:blipFill>
-          <a:blip r:embed="rId2"/>
-          <a:stretch>
-            <a:fillRect/>
-          </a:stretch>
+          <a:blip r:embed="rId2">
+            <a:extLst>
+              <a:ext uri="{28A0092B-C50C-407E-A947-70E740481C1C}">
+                <a14:useLocalDpi xmlns:a14="http://schemas.microsoft.com/office/drawing/2010/main" val="0"/>
+              </a:ext>
+            </a:extLst>
+          </a:blip>
+          <a:srcRect/>
+          <a:stretch/>
         </p:blipFill>
         <p:spPr>
           <a:xfrm>
-            <a:off x="2711626" y="2072630"/>
-            <a:ext cx="5954689" cy="4420245"/>
+            <a:off x="3419347" y="2072630"/>
+            <a:ext cx="5942367" cy="4420245"/>
           </a:xfrm>
           <a:prstGeom prst="rect">
             <a:avLst/>
@@ -3370,7 +3375,7 @@
         </p:nvCxnSpPr>
         <p:spPr>
           <a:xfrm>
-            <a:off x="3586911" y="6212547"/>
+            <a:off x="4288471" y="6212547"/>
             <a:ext cx="360000" cy="0"/>
           </a:xfrm>
           <a:prstGeom prst="straightConnector1">
@@ -3412,7 +3417,7 @@
         </p:nvSpPr>
         <p:spPr>
           <a:xfrm>
-            <a:off x="3547941" y="6234826"/>
+            <a:off x="4249501" y="6234826"/>
             <a:ext cx="437940" cy="369332"/>
           </a:xfrm>
           <a:prstGeom prst="rect">
@@ -3545,7 +3550,7 @@
         </p:nvCxnSpPr>
         <p:spPr>
           <a:xfrm flipV="1">
-            <a:off x="7621183" y="1812131"/>
+            <a:off x="8322743" y="1812131"/>
             <a:ext cx="0" cy="360000"/>
           </a:xfrm>
           <a:prstGeom prst="straightConnector1">
@@ -3587,7 +3592,7 @@
         </p:nvSpPr>
         <p:spPr>
           <a:xfrm>
-            <a:off x="7673361" y="1745477"/>
+            <a:off x="8374921" y="1745477"/>
             <a:ext cx="437940" cy="369332"/>
           </a:xfrm>
           <a:prstGeom prst="rect">
@@ -3629,7 +3634,7 @@
         </p:nvCxnSpPr>
         <p:spPr>
           <a:xfrm>
-            <a:off x="3389528" y="6042025"/>
+            <a:off x="4091088" y="6042025"/>
             <a:ext cx="0" cy="362961"/>
           </a:xfrm>
           <a:prstGeom prst="straightConnector1">
@@ -3674,7 +3679,7 @@
         </p:nvCxnSpPr>
         <p:spPr>
           <a:xfrm>
-            <a:off x="3581400" y="2183913"/>
+            <a:off x="4282960" y="2171213"/>
             <a:ext cx="4034636" cy="0"/>
           </a:xfrm>
           <a:prstGeom prst="straightConnector1">
@@ -3717,7 +3722,7 @@
         </p:nvSpPr>
         <p:spPr>
           <a:xfrm>
-            <a:off x="5220217" y="2207817"/>
+            <a:off x="5921777" y="2137153"/>
             <a:ext cx="757002" cy="369332"/>
           </a:xfrm>
           <a:prstGeom prst="rect">
@@ -3761,7 +3766,7 @@
         </p:nvSpPr>
         <p:spPr>
           <a:xfrm>
-            <a:off x="2619775" y="6042025"/>
+            <a:off x="3321335" y="6042025"/>
             <a:ext cx="723275" cy="369332"/>
           </a:xfrm>
           <a:prstGeom prst="rect">
@@ -3807,7 +3812,7 @@
         </p:nvSpPr>
         <p:spPr>
           <a:xfrm rot="5400000">
-            <a:off x="-447964" y="-1848087"/>
+            <a:off x="253596" y="-1848087"/>
             <a:ext cx="8064000" cy="8064000"/>
           </a:xfrm>
           <a:prstGeom prst="arc">
@@ -3859,7 +3864,7 @@
         </p:nvCxnSpPr>
         <p:spPr>
           <a:xfrm>
-            <a:off x="3581400" y="2172131"/>
+            <a:off x="4282960" y="2172131"/>
             <a:ext cx="0" cy="4035600"/>
           </a:xfrm>
           <a:prstGeom prst="straightConnector1">
@@ -3888,6 +3893,100 @@
           </a:fontRef>
         </p:style>
       </p:cxnSp>
+      <p:sp>
+        <p:nvSpPr>
+          <p:cNvPr id="34" name="文字方塊 33">
+            <a:extLst>
+              <a:ext uri="{FF2B5EF4-FFF2-40B4-BE49-F238E27FC236}">
+                <a16:creationId xmlns:a16="http://schemas.microsoft.com/office/drawing/2014/main" id="{DF0E1455-585E-4F90-A825-45B2D433B60D}"/>
+              </a:ext>
+            </a:extLst>
+          </p:cNvPr>
+          <p:cNvSpPr txBox="1"/>
+          <p:nvPr/>
+        </p:nvSpPr>
+        <p:spPr>
+          <a:xfrm>
+            <a:off x="4468471" y="2324784"/>
+            <a:ext cx="1218603" cy="369332"/>
+          </a:xfrm>
+          <a:prstGeom prst="rect">
+            <a:avLst/>
+          </a:prstGeom>
+          <a:noFill/>
+        </p:spPr>
+        <p:txBody>
+          <a:bodyPr wrap="none" rtlCol="0">
+            <a:spAutoFit/>
+          </a:bodyPr>
+          <a:lstStyle/>
+          <a:p>
+            <a:r>
+              <a:rPr lang="en-US" altLang="zh-TW" dirty="0" err="1">
+                <a:solidFill>
+                  <a:srgbClr val="0000FF"/>
+                </a:solidFill>
+              </a:rPr>
+              <a:t>final_angle</a:t>
+            </a:r>
+            <a:endParaRPr lang="zh-TW" altLang="en-US" dirty="0">
+              <a:solidFill>
+                <a:srgbClr val="0000FF"/>
+              </a:solidFill>
+            </a:endParaRPr>
+          </a:p>
+        </p:txBody>
+      </p:sp>
+      <p:sp>
+        <p:nvSpPr>
+          <p:cNvPr id="6" name="弧形 5">
+            <a:extLst>
+              <a:ext uri="{FF2B5EF4-FFF2-40B4-BE49-F238E27FC236}">
+                <a16:creationId xmlns:a16="http://schemas.microsoft.com/office/drawing/2014/main" id="{5548C509-EB3E-4C63-8293-5634F85E29F9}"/>
+              </a:ext>
+            </a:extLst>
+          </p:cNvPr>
+          <p:cNvSpPr/>
+          <p:nvPr/>
+        </p:nvSpPr>
+        <p:spPr>
+          <a:xfrm rot="5701152">
+            <a:off x="4023019" y="1869904"/>
+            <a:ext cx="571687" cy="571687"/>
+          </a:xfrm>
+          <a:prstGeom prst="arc">
+            <a:avLst/>
+          </a:prstGeom>
+          <a:ln w="19050">
+            <a:solidFill>
+              <a:srgbClr val="0000FF"/>
+            </a:solidFill>
+            <a:prstDash val="sysDash"/>
+          </a:ln>
+        </p:spPr>
+        <p:style>
+          <a:lnRef idx="1">
+            <a:schemeClr val="accent1"/>
+          </a:lnRef>
+          <a:fillRef idx="0">
+            <a:schemeClr val="accent1"/>
+          </a:fillRef>
+          <a:effectRef idx="0">
+            <a:schemeClr val="accent1"/>
+          </a:effectRef>
+          <a:fontRef idx="minor">
+            <a:schemeClr val="tx1"/>
+          </a:fontRef>
+        </p:style>
+        <p:txBody>
+          <a:bodyPr rtlCol="0" anchor="ctr"/>
+          <a:lstStyle/>
+          <a:p>
+            <a:pPr algn="ctr"/>
+            <a:endParaRPr lang="zh-TW" altLang="en-US"/>
+          </a:p>
+        </p:txBody>
+      </p:sp>
     </p:spTree>
     <p:extLst>
       <p:ext uri="{BB962C8B-B14F-4D97-AF65-F5344CB8AC3E}">

</xml_diff>